<commit_message>
-fix something in input field
- fixed css field in json
- fixed script field in json
</commit_message>
<xml_diff>
--- a/Documents/design/JsonForField.pptx
+++ b/Documents/design/JsonForField.pptx
@@ -105,6 +105,11 @@
       </a:defRPr>
     </a:lvl9pPr>
   </p:defaultTextStyle>
+  <p:extLst>
+    <p:ext uri="{EFAFB233-063F-42B5-8137-9DF3F51BA10A}">
+      <p15:sldGuideLst xmlns:p15="http://schemas.microsoft.com/office/powerpoint/2012/main"/>
+    </p:ext>
+  </p:extLst>
 </p:presentation>
 </file>
 
@@ -255,7 +260,7 @@
           <a:p>
             <a:fld id="{76F05A1E-192C-498C-9C9B-22DD27AF35C8}" type="datetimeFigureOut">
               <a:rPr lang="en-US" smtClean="0"/>
-              <a:t>1/1/2020</a:t>
+              <a:t>1/2/2020</a:t>
             </a:fld>
             <a:endParaRPr lang="en-US"/>
           </a:p>
@@ -453,7 +458,7 @@
           <a:p>
             <a:fld id="{76F05A1E-192C-498C-9C9B-22DD27AF35C8}" type="datetimeFigureOut">
               <a:rPr lang="en-US" smtClean="0"/>
-              <a:t>1/1/2020</a:t>
+              <a:t>1/2/2020</a:t>
             </a:fld>
             <a:endParaRPr lang="en-US"/>
           </a:p>
@@ -661,7 +666,7 @@
           <a:p>
             <a:fld id="{76F05A1E-192C-498C-9C9B-22DD27AF35C8}" type="datetimeFigureOut">
               <a:rPr lang="en-US" smtClean="0"/>
-              <a:t>1/1/2020</a:t>
+              <a:t>1/2/2020</a:t>
             </a:fld>
             <a:endParaRPr lang="en-US"/>
           </a:p>
@@ -859,7 +864,7 @@
           <a:p>
             <a:fld id="{76F05A1E-192C-498C-9C9B-22DD27AF35C8}" type="datetimeFigureOut">
               <a:rPr lang="en-US" smtClean="0"/>
-              <a:t>1/1/2020</a:t>
+              <a:t>1/2/2020</a:t>
             </a:fld>
             <a:endParaRPr lang="en-US"/>
           </a:p>
@@ -1134,7 +1139,7 @@
           <a:p>
             <a:fld id="{76F05A1E-192C-498C-9C9B-22DD27AF35C8}" type="datetimeFigureOut">
               <a:rPr lang="en-US" smtClean="0"/>
-              <a:t>1/1/2020</a:t>
+              <a:t>1/2/2020</a:t>
             </a:fld>
             <a:endParaRPr lang="en-US"/>
           </a:p>
@@ -1399,7 +1404,7 @@
           <a:p>
             <a:fld id="{76F05A1E-192C-498C-9C9B-22DD27AF35C8}" type="datetimeFigureOut">
               <a:rPr lang="en-US" smtClean="0"/>
-              <a:t>1/1/2020</a:t>
+              <a:t>1/2/2020</a:t>
             </a:fld>
             <a:endParaRPr lang="en-US"/>
           </a:p>
@@ -1811,7 +1816,7 @@
           <a:p>
             <a:fld id="{76F05A1E-192C-498C-9C9B-22DD27AF35C8}" type="datetimeFigureOut">
               <a:rPr lang="en-US" smtClean="0"/>
-              <a:t>1/1/2020</a:t>
+              <a:t>1/2/2020</a:t>
             </a:fld>
             <a:endParaRPr lang="en-US"/>
           </a:p>
@@ -1952,7 +1957,7 @@
           <a:p>
             <a:fld id="{76F05A1E-192C-498C-9C9B-22DD27AF35C8}" type="datetimeFigureOut">
               <a:rPr lang="en-US" smtClean="0"/>
-              <a:t>1/1/2020</a:t>
+              <a:t>1/2/2020</a:t>
             </a:fld>
             <a:endParaRPr lang="en-US"/>
           </a:p>
@@ -2065,7 +2070,7 @@
           <a:p>
             <a:fld id="{76F05A1E-192C-498C-9C9B-22DD27AF35C8}" type="datetimeFigureOut">
               <a:rPr lang="en-US" smtClean="0"/>
-              <a:t>1/1/2020</a:t>
+              <a:t>1/2/2020</a:t>
             </a:fld>
             <a:endParaRPr lang="en-US"/>
           </a:p>
@@ -2376,7 +2381,7 @@
           <a:p>
             <a:fld id="{76F05A1E-192C-498C-9C9B-22DD27AF35C8}" type="datetimeFigureOut">
               <a:rPr lang="en-US" smtClean="0"/>
-              <a:t>1/1/2020</a:t>
+              <a:t>1/2/2020</a:t>
             </a:fld>
             <a:endParaRPr lang="en-US"/>
           </a:p>
@@ -2664,7 +2669,7 @@
           <a:p>
             <a:fld id="{76F05A1E-192C-498C-9C9B-22DD27AF35C8}" type="datetimeFigureOut">
               <a:rPr lang="en-US" smtClean="0"/>
-              <a:t>1/1/2020</a:t>
+              <a:t>1/2/2020</a:t>
             </a:fld>
             <a:endParaRPr lang="en-US"/>
           </a:p>
@@ -2905,7 +2910,7 @@
           <a:p>
             <a:fld id="{76F05A1E-192C-498C-9C9B-22DD27AF35C8}" type="datetimeFigureOut">
               <a:rPr lang="en-US" smtClean="0"/>
-              <a:t>1/1/2020</a:t>
+              <a:t>1/2/2020</a:t>
             </a:fld>
             <a:endParaRPr lang="en-US"/>
           </a:p>
@@ -3883,7 +3888,7 @@
         <p:spPr>
           <a:xfrm>
             <a:off x="3278909" y="1560945"/>
-            <a:ext cx="4045527" cy="3343563"/>
+            <a:ext cx="4659746" cy="3343563"/>
           </a:xfrm>
           <a:prstGeom prst="roundRect">
             <a:avLst/>
@@ -4000,19 +4005,53 @@
               <a:t>	"form_control_name":"</a:t>
             </a:r>
             <a:r>
-              <a:rPr lang="en-US" dirty="0" err="1"/>
+              <a:rPr lang="en-US" dirty="0" err="1" smtClean="0"/>
               <a:t>abc</a:t>
             </a:r>
             <a:r>
+              <a:rPr lang="en-US" dirty="0" smtClean="0"/>
+              <a:t>“,</a:t>
+            </a:r>
+          </a:p>
+          <a:p>
+            <a:r>
               <a:rPr lang="en-US" dirty="0"/>
-              <a:t>"</a:t>
+              <a:t>	“</a:t>
+            </a:r>
+            <a:r>
+              <a:rPr lang="en-US" dirty="0" err="1" smtClean="0"/>
+              <a:t>cssField</a:t>
+            </a:r>
+            <a:r>
+              <a:rPr lang="en-US" dirty="0" smtClean="0"/>
+              <a:t>”:”XXXXX”,</a:t>
             </a:r>
           </a:p>
           <a:p>
             <a:r>
               <a:rPr lang="en-US" dirty="0"/>
+              <a:t>	</a:t>
+            </a:r>
+            <a:r>
+              <a:rPr lang="en-US" dirty="0"/>
+              <a:t>“</a:t>
+            </a:r>
+            <a:r>
+              <a:rPr lang="en-US" dirty="0" err="1" smtClean="0"/>
+              <a:t>scriptField</a:t>
+            </a:r>
+            <a:r>
+              <a:rPr lang="en-US" smtClean="0"/>
+              <a:t>”:”XXXXX”</a:t>
+            </a:r>
+            <a:endParaRPr lang="en-US" dirty="0" smtClean="0"/>
+          </a:p>
+          <a:p>
+            <a:r>
+              <a:rPr lang="en-US" dirty="0" smtClean="0"/>
               <a:t>}</a:t>
             </a:r>
+            <a:endParaRPr lang="en-US" dirty="0"/>
           </a:p>
         </p:txBody>
       </p:sp>

</xml_diff>